<commit_message>
chg: Added revised version of intel, JFACC TTP, Intel page. Preperations for OPAR v2
</commit_message>
<xml_diff>
--- a/UNDER DEVELOPMENT/ADMIN DOCUMENTS TTPs OPAR 2.0/ATO.pptx
+++ b/UNDER DEVELOPMENT/ADMIN DOCUMENTS TTPs OPAR 2.0/ATO.pptx
@@ -289,7 +289,7 @@
             <a:fld id="{8336ED25-DF76-4EBE-93E5-A3458893EB82}" type="datetimeFigureOut">
               <a:rPr lang="nb-NO" smtClean="0"/>
               <a:pPr/>
-              <a:t>05.11.2021</a:t>
+              <a:t>08.11.2021</a:t>
             </a:fld>
             <a:endParaRPr lang="nb-NO"/>
           </a:p>
@@ -456,7 +456,7 @@
             <a:fld id="{8336ED25-DF76-4EBE-93E5-A3458893EB82}" type="datetimeFigureOut">
               <a:rPr lang="nb-NO" smtClean="0"/>
               <a:pPr/>
-              <a:t>05.11.2021</a:t>
+              <a:t>08.11.2021</a:t>
             </a:fld>
             <a:endParaRPr lang="nb-NO"/>
           </a:p>
@@ -633,7 +633,7 @@
             <a:fld id="{8336ED25-DF76-4EBE-93E5-A3458893EB82}" type="datetimeFigureOut">
               <a:rPr lang="nb-NO" smtClean="0"/>
               <a:pPr/>
-              <a:t>05.11.2021</a:t>
+              <a:t>08.11.2021</a:t>
             </a:fld>
             <a:endParaRPr lang="nb-NO"/>
           </a:p>
@@ -800,7 +800,7 @@
             <a:fld id="{8336ED25-DF76-4EBE-93E5-A3458893EB82}" type="datetimeFigureOut">
               <a:rPr lang="nb-NO" smtClean="0"/>
               <a:pPr/>
-              <a:t>05.11.2021</a:t>
+              <a:t>08.11.2021</a:t>
             </a:fld>
             <a:endParaRPr lang="nb-NO"/>
           </a:p>
@@ -1043,7 +1043,7 @@
             <a:fld id="{8336ED25-DF76-4EBE-93E5-A3458893EB82}" type="datetimeFigureOut">
               <a:rPr lang="nb-NO" smtClean="0"/>
               <a:pPr/>
-              <a:t>05.11.2021</a:t>
+              <a:t>08.11.2021</a:t>
             </a:fld>
             <a:endParaRPr lang="nb-NO"/>
           </a:p>
@@ -1328,7 +1328,7 @@
             <a:fld id="{8336ED25-DF76-4EBE-93E5-A3458893EB82}" type="datetimeFigureOut">
               <a:rPr lang="nb-NO" smtClean="0"/>
               <a:pPr/>
-              <a:t>05.11.2021</a:t>
+              <a:t>08.11.2021</a:t>
             </a:fld>
             <a:endParaRPr lang="nb-NO"/>
           </a:p>
@@ -1752,7 +1752,7 @@
             <a:fld id="{8336ED25-DF76-4EBE-93E5-A3458893EB82}" type="datetimeFigureOut">
               <a:rPr lang="nb-NO" smtClean="0"/>
               <a:pPr/>
-              <a:t>05.11.2021</a:t>
+              <a:t>08.11.2021</a:t>
             </a:fld>
             <a:endParaRPr lang="nb-NO"/>
           </a:p>
@@ -1867,7 +1867,7 @@
             <a:fld id="{8336ED25-DF76-4EBE-93E5-A3458893EB82}" type="datetimeFigureOut">
               <a:rPr lang="nb-NO" smtClean="0"/>
               <a:pPr/>
-              <a:t>05.11.2021</a:t>
+              <a:t>08.11.2021</a:t>
             </a:fld>
             <a:endParaRPr lang="nb-NO"/>
           </a:p>
@@ -1959,7 +1959,7 @@
             <a:fld id="{8336ED25-DF76-4EBE-93E5-A3458893EB82}" type="datetimeFigureOut">
               <a:rPr lang="nb-NO" smtClean="0"/>
               <a:pPr/>
-              <a:t>05.11.2021</a:t>
+              <a:t>08.11.2021</a:t>
             </a:fld>
             <a:endParaRPr lang="nb-NO"/>
           </a:p>
@@ -2233,7 +2233,7 @@
             <a:fld id="{8336ED25-DF76-4EBE-93E5-A3458893EB82}" type="datetimeFigureOut">
               <a:rPr lang="nb-NO" smtClean="0"/>
               <a:pPr/>
-              <a:t>05.11.2021</a:t>
+              <a:t>08.11.2021</a:t>
             </a:fld>
             <a:endParaRPr lang="nb-NO"/>
           </a:p>
@@ -2483,7 +2483,7 @@
             <a:fld id="{8336ED25-DF76-4EBE-93E5-A3458893EB82}" type="datetimeFigureOut">
               <a:rPr lang="nb-NO" smtClean="0"/>
               <a:pPr/>
-              <a:t>05.11.2021</a:t>
+              <a:t>08.11.2021</a:t>
             </a:fld>
             <a:endParaRPr lang="nb-NO"/>
           </a:p>
@@ -2693,7 +2693,7 @@
             <a:fld id="{8336ED25-DF76-4EBE-93E5-A3458893EB82}" type="datetimeFigureOut">
               <a:rPr lang="nb-NO" smtClean="0"/>
               <a:pPr/>
-              <a:t>05.11.2021</a:t>
+              <a:t>08.11.2021</a:t>
             </a:fld>
             <a:endParaRPr lang="nb-NO"/>
           </a:p>
@@ -3073,7 +3073,7 @@
           <p:nvPr/>
         </p:nvPicPr>
         <p:blipFill>
-          <a:blip r:embed="rId2"/>
+          <a:blip r:embed="rId2" cstate="print"/>
           <a:srcRect/>
           <a:stretch>
             <a:fillRect/>
@@ -4295,7 +4295,7 @@
             <a:pPr algn="ctr"/>
             <a:r>
               <a:rPr lang="nb-NO" dirty="0" smtClean="0"/>
-              <a:t>D+1</a:t>
+              <a:t>D1</a:t>
             </a:r>
             <a:endParaRPr lang="nb-NO" dirty="0"/>
           </a:p>
@@ -4326,7 +4326,7 @@
             <a:pPr algn="ctr"/>
             <a:r>
               <a:rPr lang="nb-NO" dirty="0" smtClean="0"/>
-              <a:t>D+2</a:t>
+              <a:t>D2</a:t>
             </a:r>
             <a:endParaRPr lang="nb-NO" dirty="0"/>
           </a:p>
@@ -4357,7 +4357,7 @@
             <a:pPr algn="ctr"/>
             <a:r>
               <a:rPr lang="nb-NO" dirty="0" smtClean="0"/>
-              <a:t>D+3</a:t>
+              <a:t>D3</a:t>
             </a:r>
             <a:endParaRPr lang="nb-NO" dirty="0"/>
           </a:p>
@@ -4388,7 +4388,7 @@
             <a:pPr algn="ctr"/>
             <a:r>
               <a:rPr lang="nb-NO" dirty="0" smtClean="0"/>
-              <a:t>D+4</a:t>
+              <a:t>D4</a:t>
             </a:r>
             <a:endParaRPr lang="nb-NO" dirty="0"/>
           </a:p>
@@ -4450,7 +4450,23 @@
                   <a:schemeClr val="tx1"/>
                 </a:solidFill>
               </a:rPr>
-              <a:t>ATO A (D+1)</a:t>
+              <a:t>ATO A (</a:t>
+            </a:r>
+            <a:r>
+              <a:rPr lang="nb-NO" sz="900" dirty="0" smtClean="0">
+                <a:solidFill>
+                  <a:schemeClr val="tx1"/>
+                </a:solidFill>
+              </a:rPr>
+              <a:t>D1</a:t>
+            </a:r>
+            <a:r>
+              <a:rPr lang="nb-NO" sz="900" dirty="0" smtClean="0">
+                <a:solidFill>
+                  <a:schemeClr val="tx1"/>
+                </a:solidFill>
+              </a:rPr>
+              <a:t>)</a:t>
             </a:r>
             <a:endParaRPr lang="nb-NO" sz="900" dirty="0">
               <a:solidFill>
@@ -4516,7 +4532,23 @@
                   <a:schemeClr val="tx1"/>
                 </a:solidFill>
               </a:rPr>
-              <a:t>ATO C (D+3)</a:t>
+              <a:t>ATO C (</a:t>
+            </a:r>
+            <a:r>
+              <a:rPr lang="nb-NO" sz="900" dirty="0" smtClean="0">
+                <a:solidFill>
+                  <a:schemeClr val="tx1"/>
+                </a:solidFill>
+              </a:rPr>
+              <a:t>D3</a:t>
+            </a:r>
+            <a:r>
+              <a:rPr lang="nb-NO" sz="900" dirty="0" smtClean="0">
+                <a:solidFill>
+                  <a:schemeClr val="tx1"/>
+                </a:solidFill>
+              </a:rPr>
+              <a:t>)</a:t>
             </a:r>
             <a:endParaRPr lang="nb-NO" sz="900" dirty="0">
               <a:solidFill>
@@ -4582,7 +4614,23 @@
                   <a:schemeClr val="tx1"/>
                 </a:solidFill>
               </a:rPr>
-              <a:t>ATO D (D+4)</a:t>
+              <a:t>ATO D (</a:t>
+            </a:r>
+            <a:r>
+              <a:rPr lang="nb-NO" sz="900" dirty="0" smtClean="0">
+                <a:solidFill>
+                  <a:schemeClr val="tx1"/>
+                </a:solidFill>
+              </a:rPr>
+              <a:t>D4</a:t>
+            </a:r>
+            <a:r>
+              <a:rPr lang="nb-NO" sz="900" dirty="0" smtClean="0">
+                <a:solidFill>
+                  <a:schemeClr val="tx1"/>
+                </a:solidFill>
+              </a:rPr>
+              <a:t>)</a:t>
             </a:r>
             <a:endParaRPr lang="nb-NO" sz="900" dirty="0">
               <a:solidFill>
@@ -4775,7 +4823,23 @@
                   <a:schemeClr val="tx1"/>
                 </a:solidFill>
               </a:rPr>
-              <a:t>ATO B (D+2)</a:t>
+              <a:t>ATO B (</a:t>
+            </a:r>
+            <a:r>
+              <a:rPr lang="nb-NO" sz="900" dirty="0" smtClean="0">
+                <a:solidFill>
+                  <a:schemeClr val="tx1"/>
+                </a:solidFill>
+              </a:rPr>
+              <a:t>D2</a:t>
+            </a:r>
+            <a:r>
+              <a:rPr lang="nb-NO" sz="900" dirty="0" smtClean="0">
+                <a:solidFill>
+                  <a:schemeClr val="tx1"/>
+                </a:solidFill>
+              </a:rPr>
+              <a:t>)</a:t>
             </a:r>
             <a:endParaRPr lang="nb-NO" sz="900" dirty="0">
               <a:solidFill>

</xml_diff>